<commit_message>
- update after walkthrough of Adaptive cards demo
</commit_message>
<xml_diff>
--- a/01 - Microsoft Adaptive Cards/01 Adaptive Cards and Actionable Messages.pptx
+++ b/01 - Microsoft Adaptive Cards/01 Adaptive Cards and Actionable Messages.pptx
@@ -5,10 +5,10 @@
     <p:sldMasterId id="2147484229" r:id="rId1"/>
   </p:sldMasterIdLst>
   <p:notesMasterIdLst>
-    <p:notesMasterId r:id="rId13"/>
+    <p:notesMasterId r:id="rId11"/>
   </p:notesMasterIdLst>
   <p:handoutMasterIdLst>
-    <p:handoutMasterId r:id="rId14"/>
+    <p:handoutMasterId r:id="rId12"/>
   </p:handoutMasterIdLst>
   <p:sldIdLst>
     <p:sldId id="257" r:id="rId2"/>
@@ -19,9 +19,7 @@
     <p:sldId id="310" r:id="rId7"/>
     <p:sldId id="313" r:id="rId8"/>
     <p:sldId id="265" r:id="rId9"/>
-    <p:sldId id="307" r:id="rId10"/>
-    <p:sldId id="261" r:id="rId11"/>
-    <p:sldId id="260" r:id="rId12"/>
+    <p:sldId id="260" r:id="rId10"/>
   </p:sldIdLst>
   <p:sldSz cx="12436475" cy="6994525"/>
   <p:notesSz cx="6858000" cy="9144000"/>
@@ -137,8 +135,6 @@
         </p14:section>
         <p14:section name="Summary" id="{0515D85C-C91E-4BDB-B673-651C2D8A364D}">
           <p14:sldIdLst>
-            <p14:sldId id="307"/>
-            <p14:sldId id="261"/>
             <p14:sldId id="260"/>
           </p14:sldIdLst>
         </p14:section>
@@ -167,7 +163,7 @@
 
 <file path=ppt/commentAuthors.xml><?xml version="1.0" encoding="utf-8"?>
 <p:cmAuthorLst xmlns:a="http://schemas.openxmlformats.org/drawingml/2006/main" xmlns:r="http://schemas.openxmlformats.org/officeDocument/2006/relationships" xmlns:p="http://schemas.openxmlformats.org/presentationml/2006/main">
-  <p:cmAuthor id="4" name="Author" initials="A" lastIdx="0" clrIdx="4"/>
+  <p:cmAuthor id="5" name="Forfatter" initials="F" lastIdx="0" clrIdx="5"/>
 </p:cmAuthorLst>
 </file>
 
@@ -257,7 +253,7 @@
               <a:rPr lang="en-US" smtClean="0">
                 <a:latin typeface="Segoe UI" pitchFamily="34" charset="0"/>
               </a:rPr>
-              <a:t>6/6/2018 7:06 PM</a:t>
+              <a:t>10/18/2018 11:39 AM</a:t>
             </a:fld>
             <a:endParaRPr lang="en-US" dirty="0">
               <a:latin typeface="Segoe UI" pitchFamily="34" charset="0"/>
@@ -346,7 +342,7 @@
               <a:rPr lang="en-US" smtClean="0">
                 <a:latin typeface="Segoe UI" pitchFamily="34" charset="0"/>
               </a:rPr>
-              <a:t>‹#›</a:t>
+              <a:t>‹nr.›</a:t>
             </a:fld>
             <a:endParaRPr lang="en-US" dirty="0">
               <a:latin typeface="Segoe UI" pitchFamily="34" charset="0"/>
@@ -551,7 +547,7 @@
           <a:p>
             <a:fld id="{D18B56EA-E28F-4F92-9F16-7A6F2501B303}" type="datetime8">
               <a:rPr lang="en-US" smtClean="0"/>
-              <a:t>6/6/2018 6:47 PM</a:t>
+              <a:t>10/18/2018 10:19 AM</a:t>
             </a:fld>
             <a:endParaRPr lang="en-US" dirty="0"/>
           </a:p>
@@ -648,7 +644,7 @@
             <a:fld id="{B4008EB6-D09E-4580-8CD6-DDB14511944F}" type="slidenum">
               <a:rPr lang="en-US" smtClean="0"/>
               <a:pPr/>
-              <a:t>‹#›</a:t>
+              <a:t>‹nr.›</a:t>
             </a:fld>
             <a:endParaRPr lang="en-US" dirty="0"/>
           </a:p>
@@ -934,7 +930,7 @@
           <a:p>
             <a:fld id="{D18B56EA-E28F-4F92-9F16-7A6F2501B303}" type="datetime8">
               <a:rPr lang="en-US" smtClean="0"/>
-              <a:t>6/6/2018 6:47 PM</a:t>
+              <a:t>10/18/2018 10:19 AM</a:t>
             </a:fld>
             <a:endParaRPr lang="en-US" dirty="0"/>
           </a:p>
@@ -1220,7 +1216,7 @@
                 <a:tabLst/>
                 <a:defRPr/>
               </a:pPr>
-              <a:t>6/6/2018 6:47 PM</a:t>
+              <a:t>10/18/2018 10:19 AM</a:t>
             </a:fld>
             <a:endParaRPr kumimoji="0" lang="en-US" sz="1200" b="0" i="0" u="none" strike="noStrike" kern="1200" cap="none" spc="0" normalizeH="0" baseline="0" noProof="0" dirty="0">
               <a:ln>
@@ -1484,7 +1480,7 @@
           <a:p>
             <a:fld id="{D18B56EA-E28F-4F92-9F16-7A6F2501B303}" type="datetime8">
               <a:rPr lang="en-US" smtClean="0"/>
-              <a:t>6/6/2018 6:47 PM</a:t>
+              <a:t>10/18/2018 10:19 AM</a:t>
             </a:fld>
             <a:endParaRPr lang="en-US" dirty="0"/>
           </a:p>
@@ -1668,7 +1664,7 @@
           <a:p>
             <a:fld id="{D18B56EA-E28F-4F92-9F16-7A6F2501B303}" type="datetime8">
               <a:rPr lang="en-US" smtClean="0"/>
-              <a:t>6/6/2018 6:47 PM</a:t>
+              <a:t>10/18/2018 10:19 AM</a:t>
             </a:fld>
             <a:endParaRPr lang="en-US" dirty="0"/>
           </a:p>
@@ -1852,7 +1848,7 @@
           <a:p>
             <a:fld id="{D18B56EA-E28F-4F92-9F16-7A6F2501B303}" type="datetime8">
               <a:rPr lang="en-US" smtClean="0"/>
-              <a:t>6/6/2018 6:47 PM</a:t>
+              <a:t>10/18/2018 10:19 AM</a:t>
             </a:fld>
             <a:endParaRPr lang="en-US" dirty="0"/>
           </a:p>
@@ -2033,7 +2029,7 @@
           <a:p>
             <a:fld id="{D18B56EA-E28F-4F92-9F16-7A6F2501B303}" type="datetime8">
               <a:rPr lang="en-US" smtClean="0"/>
-              <a:t>6/6/2018 6:47 PM</a:t>
+              <a:t>10/18/2018 10:19 AM</a:t>
             </a:fld>
             <a:endParaRPr lang="en-US" dirty="0"/>
           </a:p>
@@ -2214,7 +2210,7 @@
           <a:p>
             <a:fld id="{D18B56EA-E28F-4F92-9F16-7A6F2501B303}" type="datetime8">
               <a:rPr lang="en-US" smtClean="0"/>
-              <a:t>6/6/2018 6:47 PM</a:t>
+              <a:t>10/18/2018 10:19 AM</a:t>
             </a:fld>
             <a:endParaRPr lang="en-US" dirty="0"/>
           </a:p>
@@ -2238,188 +2234,7 @@
             <a:fld id="{B4008EB6-D09E-4580-8CD6-DDB14511944F}" type="slidenum">
               <a:rPr lang="en-US" smtClean="0"/>
               <a:pPr/>
-              <a:t>10</a:t>
-            </a:fld>
-            <a:endParaRPr lang="en-US" dirty="0"/>
-          </a:p>
-        </p:txBody>
-      </p:sp>
-    </p:spTree>
-    <p:extLst>
-      <p:ext uri="{BB962C8B-B14F-4D97-AF65-F5344CB8AC3E}">
-        <p14:creationId xmlns:p14="http://schemas.microsoft.com/office/powerpoint/2010/main" val="3298864739"/>
-      </p:ext>
-    </p:extLst>
-  </p:cSld>
-  <p:clrMapOvr>
-    <a:masterClrMapping/>
-  </p:clrMapOvr>
-</p:notes>
-</file>
-
-<file path=ppt/notesSlides/notesSlide8.xml><?xml version="1.0" encoding="utf-8"?>
-<p:notes xmlns:a="http://schemas.openxmlformats.org/drawingml/2006/main" xmlns:r="http://schemas.openxmlformats.org/officeDocument/2006/relationships" xmlns:p="http://schemas.openxmlformats.org/presentationml/2006/main">
-  <p:cSld>
-    <p:spTree>
-      <p:nvGrpSpPr>
-        <p:cNvPr id="1" name=""/>
-        <p:cNvGrpSpPr/>
-        <p:nvPr/>
-      </p:nvGrpSpPr>
-      <p:grpSpPr>
-        <a:xfrm>
-          <a:off x="0" y="0"/>
-          <a:ext cx="0" cy="0"/>
-          <a:chOff x="0" y="0"/>
-          <a:chExt cx="0" cy="0"/>
-        </a:xfrm>
-      </p:grpSpPr>
-      <p:sp>
-        <p:nvSpPr>
-          <p:cNvPr id="2" name="Slide Image Placeholder 1"/>
-          <p:cNvSpPr>
-            <a:spLocks noGrp="1" noRot="1" noChangeAspect="1"/>
-          </p:cNvSpPr>
-          <p:nvPr>
-            <p:ph type="sldImg"/>
-          </p:nvPr>
-        </p:nvSpPr>
-        <p:spPr/>
-      </p:sp>
-      <p:sp>
-        <p:nvSpPr>
-          <p:cNvPr id="3" name="Notes Placeholder 2"/>
-          <p:cNvSpPr>
-            <a:spLocks noGrp="1"/>
-          </p:cNvSpPr>
-          <p:nvPr>
-            <p:ph type="body" idx="1"/>
-          </p:nvPr>
-        </p:nvSpPr>
-        <p:spPr/>
-        <p:txBody>
-          <a:bodyPr/>
-          <a:lstStyle/>
-          <a:p>
-            <a:endParaRPr lang="en-US"/>
-          </a:p>
-        </p:txBody>
-      </p:sp>
-      <p:sp>
-        <p:nvSpPr>
-          <p:cNvPr id="4" name="Header Placeholder 3"/>
-          <p:cNvSpPr>
-            <a:spLocks noGrp="1"/>
-          </p:cNvSpPr>
-          <p:nvPr>
-            <p:ph type="hdr" sz="quarter" idx="10"/>
-          </p:nvPr>
-        </p:nvSpPr>
-        <p:spPr/>
-        <p:txBody>
-          <a:bodyPr/>
-          <a:lstStyle/>
-          <a:p>
-            <a:endParaRPr lang="en-US" dirty="0"/>
-          </a:p>
-        </p:txBody>
-      </p:sp>
-      <p:sp>
-        <p:nvSpPr>
-          <p:cNvPr id="5" name="Footer Placeholder 4"/>
-          <p:cNvSpPr>
-            <a:spLocks noGrp="1"/>
-          </p:cNvSpPr>
-          <p:nvPr>
-            <p:ph type="ftr" sz="quarter" idx="11"/>
-          </p:nvPr>
-        </p:nvSpPr>
-        <p:spPr/>
-        <p:txBody>
-          <a:bodyPr/>
-          <a:lstStyle/>
-          <a:p>
-            <a:pPr defTabSz="914099" eaLnBrk="0" hangingPunct="0"/>
-            <a:r>
-              <a:rPr lang="en-US" sz="400">
-                <a:gradFill>
-                  <a:gsLst>
-                    <a:gs pos="0">
-                      <a:prstClr val="black"/>
-                    </a:gs>
-                    <a:gs pos="100000">
-                      <a:prstClr val="black"/>
-                    </a:gs>
-                  </a:gsLst>
-                  <a:lin ang="5400000" scaled="0"/>
-                </a:gradFill>
-                <a:latin typeface="Segoe UI" pitchFamily="34" charset="0"/>
-                <a:ea typeface="Segoe UI" pitchFamily="34" charset="0"/>
-                <a:cs typeface="Segoe UI" pitchFamily="34" charset="0"/>
-              </a:rPr>
-              <a:t>© Microsoft Corporation. All rights reserved. MICROSOFT MAKES NO WARRANTIES, EXPRESS, IMPLIED OR STATUTORY, AS TO THE INFORMATION IN THIS PRESENTATION.</a:t>
-            </a:r>
-            <a:endParaRPr lang="en-US" sz="400" dirty="0">
-              <a:gradFill>
-                <a:gsLst>
-                  <a:gs pos="0">
-                    <a:prstClr val="black"/>
-                  </a:gs>
-                  <a:gs pos="100000">
-                    <a:prstClr val="black"/>
-                  </a:gs>
-                </a:gsLst>
-                <a:lin ang="5400000" scaled="0"/>
-              </a:gradFill>
-              <a:latin typeface="Segoe UI" pitchFamily="34" charset="0"/>
-              <a:ea typeface="Segoe UI" pitchFamily="34" charset="0"/>
-              <a:cs typeface="Segoe UI" pitchFamily="34" charset="0"/>
-            </a:endParaRPr>
-          </a:p>
-        </p:txBody>
-      </p:sp>
-      <p:sp>
-        <p:nvSpPr>
-          <p:cNvPr id="6" name="Date Placeholder 5"/>
-          <p:cNvSpPr>
-            <a:spLocks noGrp="1"/>
-          </p:cNvSpPr>
-          <p:nvPr>
-            <p:ph type="dt" idx="12"/>
-          </p:nvPr>
-        </p:nvSpPr>
-        <p:spPr/>
-        <p:txBody>
-          <a:bodyPr/>
-          <a:lstStyle/>
-          <a:p>
-            <a:fld id="{D18B56EA-E28F-4F92-9F16-7A6F2501B303}" type="datetime8">
-              <a:rPr lang="en-US" smtClean="0"/>
-              <a:t>6/6/2018 6:47 PM</a:t>
-            </a:fld>
-            <a:endParaRPr lang="en-US" dirty="0"/>
-          </a:p>
-        </p:txBody>
-      </p:sp>
-      <p:sp>
-        <p:nvSpPr>
-          <p:cNvPr id="7" name="Slide Number Placeholder 6"/>
-          <p:cNvSpPr>
-            <a:spLocks noGrp="1"/>
-          </p:cNvSpPr>
-          <p:nvPr>
-            <p:ph type="sldNum" sz="quarter" idx="13"/>
-          </p:nvPr>
-        </p:nvSpPr>
-        <p:spPr/>
-        <p:txBody>
-          <a:bodyPr/>
-          <a:lstStyle/>
-          <a:p>
-            <a:fld id="{B4008EB6-D09E-4580-8CD6-DDB14511944F}" type="slidenum">
-              <a:rPr lang="en-US" smtClean="0"/>
-              <a:pPr/>
-              <a:t>11</a:t>
+              <a:t>9</a:t>
             </a:fld>
             <a:endParaRPr lang="en-US" dirty="0"/>
           </a:p>
@@ -12905,103 +12720,6 @@
       </p:transition>
     </mc:Fallback>
   </mc:AlternateContent>
-</p:sld>
-</file>
-
-<file path=ppt/slides/slide10.xml><?xml version="1.0" encoding="utf-8"?>
-<p:sld xmlns:a="http://schemas.openxmlformats.org/drawingml/2006/main" xmlns:r="http://schemas.openxmlformats.org/officeDocument/2006/relationships" xmlns:p="http://schemas.openxmlformats.org/presentationml/2006/main">
-  <p:cSld>
-    <p:spTree>
-      <p:nvGrpSpPr>
-        <p:cNvPr id="1" name=""/>
-        <p:cNvGrpSpPr/>
-        <p:nvPr/>
-      </p:nvGrpSpPr>
-      <p:grpSpPr>
-        <a:xfrm>
-          <a:off x="0" y="0"/>
-          <a:ext cx="0" cy="0"/>
-          <a:chOff x="0" y="0"/>
-          <a:chExt cx="0" cy="0"/>
-        </a:xfrm>
-      </p:grpSpPr>
-      <p:sp>
-        <p:nvSpPr>
-          <p:cNvPr id="2" name="Title 1"/>
-          <p:cNvSpPr>
-            <a:spLocks noGrp="1"/>
-          </p:cNvSpPr>
-          <p:nvPr>
-            <p:ph type="title"/>
-          </p:nvPr>
-        </p:nvSpPr>
-        <p:spPr/>
-        <p:txBody>
-          <a:bodyPr/>
-          <a:lstStyle/>
-          <a:p>
-            <a:r>
-              <a:rPr lang="en-US" dirty="0"/>
-              <a:t>Thank you</a:t>
-            </a:r>
-          </a:p>
-        </p:txBody>
-      </p:sp>
-    </p:spTree>
-    <p:extLst>
-      <p:ext uri="{BB962C8B-B14F-4D97-AF65-F5344CB8AC3E}">
-        <p14:creationId xmlns:p14="http://schemas.microsoft.com/office/powerpoint/2010/main" val="1858403159"/>
-      </p:ext>
-    </p:extLst>
-  </p:cSld>
-  <p:clrMapOvr>
-    <a:masterClrMapping/>
-  </p:clrMapOvr>
-  <mc:AlternateContent xmlns:mc="http://schemas.openxmlformats.org/markup-compatibility/2006" xmlns:p14="http://schemas.microsoft.com/office/powerpoint/2010/main">
-    <mc:Choice Requires="p14">
-      <p:transition spd="med" p14:dur="700">
-        <p:fade/>
-      </p:transition>
-    </mc:Choice>
-    <mc:Fallback xmlns="">
-      <p:transition spd="med">
-        <p:fade/>
-      </p:transition>
-    </mc:Fallback>
-  </mc:AlternateContent>
-</p:sld>
-</file>
-
-<file path=ppt/slides/slide11.xml><?xml version="1.0" encoding="utf-8"?>
-<p:sld xmlns:a="http://schemas.openxmlformats.org/drawingml/2006/main" xmlns:r="http://schemas.openxmlformats.org/officeDocument/2006/relationships" xmlns:p="http://schemas.openxmlformats.org/presentationml/2006/main">
-  <p:cSld>
-    <p:spTree>
-      <p:nvGrpSpPr>
-        <p:cNvPr id="1" name=""/>
-        <p:cNvGrpSpPr/>
-        <p:nvPr/>
-      </p:nvGrpSpPr>
-      <p:grpSpPr>
-        <a:xfrm>
-          <a:off x="0" y="0"/>
-          <a:ext cx="0" cy="0"/>
-          <a:chOff x="0" y="0"/>
-          <a:chExt cx="0" cy="0"/>
-        </a:xfrm>
-      </p:grpSpPr>
-    </p:spTree>
-    <p:extLst>
-      <p:ext uri="{BB962C8B-B14F-4D97-AF65-F5344CB8AC3E}">
-        <p14:creationId xmlns:p14="http://schemas.microsoft.com/office/powerpoint/2010/main" val="1849778584"/>
-      </p:ext>
-    </p:extLst>
-  </p:cSld>
-  <p:clrMapOvr>
-    <a:masterClrMapping/>
-  </p:clrMapOvr>
-  <p:transition>
-    <p:fade/>
-  </p:transition>
 </p:sld>
 </file>
 
@@ -16075,329 +15793,10 @@
           <a:chExt cx="0" cy="0"/>
         </a:xfrm>
       </p:grpSpPr>
-      <p:pic>
-        <p:nvPicPr>
-          <p:cNvPr id="3" name="Picture 2">
-            <a:extLst>
-              <a:ext uri="{FF2B5EF4-FFF2-40B4-BE49-F238E27FC236}">
-                <a16:creationId xmlns:a16="http://schemas.microsoft.com/office/drawing/2014/main" id="{EE215EA7-7174-487D-949C-048DC5016E47}"/>
-              </a:ext>
-            </a:extLst>
-          </p:cNvPr>
-          <p:cNvPicPr>
-            <a:picLocks noChangeAspect="1"/>
-          </p:cNvPicPr>
-          <p:nvPr/>
-        </p:nvPicPr>
-        <p:blipFill rotWithShape="1">
-          <a:blip r:embed="rId2" cstate="screen">
-            <a:extLst>
-              <a:ext uri="{28A0092B-C50C-407E-A947-70E740481C1C}">
-                <a14:useLocalDpi xmlns:a14="http://schemas.microsoft.com/office/drawing/2010/main"/>
-              </a:ext>
-            </a:extLst>
-          </a:blip>
-          <a:srcRect l="27426" r="10166"/>
-          <a:stretch/>
-        </p:blipFill>
-        <p:spPr>
-          <a:xfrm>
-            <a:off x="5887091" y="0"/>
-            <a:ext cx="6549384" cy="6994525"/>
-          </a:xfrm>
-          <a:prstGeom prst="rect">
-            <a:avLst/>
-          </a:prstGeom>
-        </p:spPr>
-      </p:pic>
-      <p:sp>
-        <p:nvSpPr>
-          <p:cNvPr id="4" name="Title 3">
-            <a:extLst>
-              <a:ext uri="{FF2B5EF4-FFF2-40B4-BE49-F238E27FC236}">
-                <a16:creationId xmlns:a16="http://schemas.microsoft.com/office/drawing/2014/main" id="{8047349F-0B8F-4D12-A39C-718C1C57DDFF}"/>
-              </a:ext>
-            </a:extLst>
-          </p:cNvPr>
-          <p:cNvSpPr>
-            <a:spLocks noGrp="1"/>
-          </p:cNvSpPr>
-          <p:nvPr>
-            <p:ph type="title"/>
-          </p:nvPr>
-        </p:nvSpPr>
-        <p:spPr>
-          <a:xfrm>
-            <a:off x="454864" y="1843063"/>
-            <a:ext cx="11533187" cy="411162"/>
-          </a:xfrm>
-        </p:spPr>
-        <p:txBody>
-          <a:bodyPr/>
-          <a:lstStyle/>
-          <a:p>
-            <a:r>
-              <a:rPr lang="en-US" dirty="0"/>
-              <a:t>Summary</a:t>
-            </a:r>
-          </a:p>
-        </p:txBody>
-      </p:sp>
-      <p:sp>
-        <p:nvSpPr>
-          <p:cNvPr id="10" name="Text Placeholder 6">
-            <a:extLst>
-              <a:ext uri="{FF2B5EF4-FFF2-40B4-BE49-F238E27FC236}">
-                <a16:creationId xmlns:a16="http://schemas.microsoft.com/office/drawing/2014/main" id="{61D48218-75E0-4C6C-BFA7-A1010BADED35}"/>
-              </a:ext>
-            </a:extLst>
-          </p:cNvPr>
-          <p:cNvSpPr txBox="1">
-            <a:spLocks/>
-          </p:cNvSpPr>
-          <p:nvPr/>
-        </p:nvSpPr>
-        <p:spPr>
-          <a:xfrm>
-            <a:off x="465139" y="2621905"/>
-            <a:ext cx="4234184" cy="221599"/>
-          </a:xfrm>
-          <a:prstGeom prst="rect">
-            <a:avLst/>
-          </a:prstGeom>
-        </p:spPr>
-        <p:txBody>
-          <a:bodyPr vert="horz" wrap="square" lIns="0" tIns="0" rIns="0" bIns="0" rtlCol="0">
-            <a:spAutoFit/>
-          </a:bodyPr>
-          <a:lstStyle>
-            <a:lvl1pPr marL="0" marR="0" indent="0" algn="l" defTabSz="932742" rtl="0" eaLnBrk="1" fontAlgn="auto" latinLnBrk="0" hangingPunct="1">
-              <a:lnSpc>
-                <a:spcPts val="1800"/>
-              </a:lnSpc>
-              <a:spcBef>
-                <a:spcPts val="0"/>
-              </a:spcBef>
-              <a:spcAft>
-                <a:spcPts val="0"/>
-              </a:spcAft>
-              <a:buClrTx/>
-              <a:buSzPct val="90000"/>
-              <a:buFont typeface="Wingdings" panose="05000000000000000000" pitchFamily="2" charset="2"/>
-              <a:buNone/>
-              <a:tabLst/>
-              <a:defRPr sz="1400" b="1" kern="1200" spc="0" baseline="0">
-                <a:solidFill>
-                  <a:schemeClr val="tx1"/>
-                </a:solidFill>
-                <a:latin typeface="+mn-lt"/>
-                <a:ea typeface="+mn-ea"/>
-                <a:cs typeface="+mn-cs"/>
-              </a:defRPr>
-            </a:lvl1pPr>
-            <a:lvl2pPr marL="0" marR="0" indent="0" algn="l" defTabSz="932742" rtl="0" eaLnBrk="1" fontAlgn="auto" latinLnBrk="0" hangingPunct="1">
-              <a:lnSpc>
-                <a:spcPts val="1800"/>
-              </a:lnSpc>
-              <a:spcBef>
-                <a:spcPts val="0"/>
-              </a:spcBef>
-              <a:spcAft>
-                <a:spcPts val="0"/>
-              </a:spcAft>
-              <a:buClrTx/>
-              <a:buSzPct val="90000"/>
-              <a:buFont typeface="Wingdings" panose="05000000000000000000" pitchFamily="2" charset="2"/>
-              <a:buNone/>
-              <a:tabLst/>
-              <a:defRPr sz="1400" kern="1200" spc="0" baseline="0">
-                <a:solidFill>
-                  <a:schemeClr val="tx1"/>
-                </a:solidFill>
-                <a:latin typeface="+mn-lt"/>
-                <a:ea typeface="+mn-ea"/>
-                <a:cs typeface="+mn-cs"/>
-              </a:defRPr>
-            </a:lvl2pPr>
-            <a:lvl3pPr marL="457200" marR="0" indent="0" algn="l" defTabSz="932742" rtl="0" eaLnBrk="1" fontAlgn="auto" latinLnBrk="0" hangingPunct="1">
-              <a:lnSpc>
-                <a:spcPct val="90000"/>
-              </a:lnSpc>
-              <a:spcBef>
-                <a:spcPct val="20000"/>
-              </a:spcBef>
-              <a:spcAft>
-                <a:spcPts val="0"/>
-              </a:spcAft>
-              <a:buClrTx/>
-              <a:buSzPct val="90000"/>
-              <a:buFont typeface="Wingdings" panose="05000000000000000000" pitchFamily="2" charset="2"/>
-              <a:buNone/>
-              <a:tabLst/>
-              <a:defRPr sz="2400" kern="1200" spc="0" baseline="0">
-                <a:gradFill>
-                  <a:gsLst>
-                    <a:gs pos="1250">
-                      <a:schemeClr val="tx1"/>
-                    </a:gs>
-                    <a:gs pos="100000">
-                      <a:schemeClr val="tx1"/>
-                    </a:gs>
-                  </a:gsLst>
-                  <a:lin ang="5400000" scaled="0"/>
-                </a:gradFill>
-                <a:latin typeface="+mn-lt"/>
-                <a:ea typeface="+mn-ea"/>
-                <a:cs typeface="+mn-cs"/>
-              </a:defRPr>
-            </a:lvl3pPr>
-            <a:lvl4pPr marL="685800" marR="0" indent="0" algn="l" defTabSz="932742" rtl="0" eaLnBrk="1" fontAlgn="auto" latinLnBrk="0" hangingPunct="1">
-              <a:lnSpc>
-                <a:spcPct val="90000"/>
-              </a:lnSpc>
-              <a:spcBef>
-                <a:spcPct val="20000"/>
-              </a:spcBef>
-              <a:spcAft>
-                <a:spcPts val="0"/>
-              </a:spcAft>
-              <a:buClrTx/>
-              <a:buSzPct val="90000"/>
-              <a:buFont typeface="Wingdings" panose="05000000000000000000" pitchFamily="2" charset="2"/>
-              <a:buNone/>
-              <a:tabLst/>
-              <a:defRPr sz="2200" kern="1200" spc="0" baseline="0">
-                <a:gradFill>
-                  <a:gsLst>
-                    <a:gs pos="1250">
-                      <a:schemeClr val="tx1"/>
-                    </a:gs>
-                    <a:gs pos="100000">
-                      <a:schemeClr val="tx1"/>
-                    </a:gs>
-                  </a:gsLst>
-                  <a:lin ang="5400000" scaled="0"/>
-                </a:gradFill>
-                <a:latin typeface="+mn-lt"/>
-                <a:ea typeface="+mn-ea"/>
-                <a:cs typeface="+mn-cs"/>
-              </a:defRPr>
-            </a:lvl4pPr>
-            <a:lvl5pPr marL="914400" marR="0" indent="0" algn="l" defTabSz="932742" rtl="0" eaLnBrk="1" fontAlgn="auto" latinLnBrk="0" hangingPunct="1">
-              <a:lnSpc>
-                <a:spcPct val="90000"/>
-              </a:lnSpc>
-              <a:spcBef>
-                <a:spcPct val="20000"/>
-              </a:spcBef>
-              <a:spcAft>
-                <a:spcPts val="0"/>
-              </a:spcAft>
-              <a:buClrTx/>
-              <a:buSzPct val="90000"/>
-              <a:buFont typeface="Wingdings" panose="05000000000000000000" pitchFamily="2" charset="2"/>
-              <a:buNone/>
-              <a:tabLst/>
-              <a:defRPr sz="2200" kern="1200" spc="0" baseline="0">
-                <a:gradFill>
-                  <a:gsLst>
-                    <a:gs pos="1250">
-                      <a:schemeClr val="tx1"/>
-                    </a:gs>
-                    <a:gs pos="100000">
-                      <a:schemeClr val="tx1"/>
-                    </a:gs>
-                  </a:gsLst>
-                  <a:lin ang="5400000" scaled="0"/>
-                </a:gradFill>
-                <a:latin typeface="+mn-lt"/>
-                <a:ea typeface="+mn-ea"/>
-                <a:cs typeface="+mn-cs"/>
-              </a:defRPr>
-            </a:lvl5pPr>
-            <a:lvl6pPr marL="2565040" indent="-233186" algn="l" defTabSz="932742" rtl="0" eaLnBrk="1" latinLnBrk="0" hangingPunct="1">
-              <a:spcBef>
-                <a:spcPct val="20000"/>
-              </a:spcBef>
-              <a:buFont typeface="Arial" pitchFamily="34" charset="0"/>
-              <a:buChar char="•"/>
-              <a:defRPr sz="2000" kern="1200">
-                <a:solidFill>
-                  <a:schemeClr val="tx1"/>
-                </a:solidFill>
-                <a:latin typeface="+mn-lt"/>
-                <a:ea typeface="+mn-ea"/>
-                <a:cs typeface="+mn-cs"/>
-              </a:defRPr>
-            </a:lvl6pPr>
-            <a:lvl7pPr marL="3031412" indent="-233186" algn="l" defTabSz="932742" rtl="0" eaLnBrk="1" latinLnBrk="0" hangingPunct="1">
-              <a:spcBef>
-                <a:spcPct val="20000"/>
-              </a:spcBef>
-              <a:buFont typeface="Arial" pitchFamily="34" charset="0"/>
-              <a:buChar char="•"/>
-              <a:defRPr sz="2000" kern="1200">
-                <a:solidFill>
-                  <a:schemeClr val="tx1"/>
-                </a:solidFill>
-                <a:latin typeface="+mn-lt"/>
-                <a:ea typeface="+mn-ea"/>
-                <a:cs typeface="+mn-cs"/>
-              </a:defRPr>
-            </a:lvl7pPr>
-            <a:lvl8pPr marL="3497783" indent="-233186" algn="l" defTabSz="932742" rtl="0" eaLnBrk="1" latinLnBrk="0" hangingPunct="1">
-              <a:spcBef>
-                <a:spcPct val="20000"/>
-              </a:spcBef>
-              <a:buFont typeface="Arial" pitchFamily="34" charset="0"/>
-              <a:buChar char="•"/>
-              <a:defRPr sz="2000" kern="1200">
-                <a:solidFill>
-                  <a:schemeClr val="tx1"/>
-                </a:solidFill>
-                <a:latin typeface="+mn-lt"/>
-                <a:ea typeface="+mn-ea"/>
-                <a:cs typeface="+mn-cs"/>
-              </a:defRPr>
-            </a:lvl8pPr>
-            <a:lvl9pPr marL="3964155" indent="-233186" algn="l" defTabSz="932742" rtl="0" eaLnBrk="1" latinLnBrk="0" hangingPunct="1">
-              <a:spcBef>
-                <a:spcPct val="20000"/>
-              </a:spcBef>
-              <a:buFont typeface="Arial" pitchFamily="34" charset="0"/>
-              <a:buChar char="•"/>
-              <a:defRPr sz="2000" kern="1200">
-                <a:solidFill>
-                  <a:schemeClr val="tx1"/>
-                </a:solidFill>
-                <a:latin typeface="+mn-lt"/>
-                <a:ea typeface="+mn-ea"/>
-                <a:cs typeface="+mn-cs"/>
-              </a:defRPr>
-            </a:lvl9pPr>
-          </a:lstStyle>
-          <a:p>
-            <a:pPr lvl="0">
-              <a:lnSpc>
-                <a:spcPct val="90000"/>
-              </a:lnSpc>
-              <a:spcBef>
-                <a:spcPts val="1800"/>
-              </a:spcBef>
-            </a:pPr>
-            <a:endParaRPr lang="en-US" sz="1600" b="0" dirty="0">
-              <a:solidFill>
-                <a:srgbClr val="2F2F2F"/>
-              </a:solidFill>
-              <a:latin typeface="Segoe UI Semibold"/>
-            </a:endParaRPr>
-          </a:p>
-        </p:txBody>
-      </p:sp>
     </p:spTree>
     <p:extLst>
       <p:ext uri="{BB962C8B-B14F-4D97-AF65-F5344CB8AC3E}">
-        <p14:creationId xmlns:p14="http://schemas.microsoft.com/office/powerpoint/2010/main" val="3651672785"/>
+        <p14:creationId xmlns:p14="http://schemas.microsoft.com/office/powerpoint/2010/main" val="1849778584"/>
       </p:ext>
     </p:extLst>
   </p:cSld>

</xml_diff>